<commit_message>
user accounts added, need to sort access control
</commit_message>
<xml_diff>
--- a/401_OperatingSystems/assignments/LINUX UBUNTU.pptx
+++ b/401_OperatingSystems/assignments/LINUX UBUNTU.pptx
@@ -14,6 +14,11 @@
     <p:sldId id="262" r:id="rId8"/>
     <p:sldId id="263" r:id="rId9"/>
     <p:sldId id="264" r:id="rId10"/>
+    <p:sldId id="265" r:id="rId11"/>
+    <p:sldId id="266" r:id="rId12"/>
+    <p:sldId id="267" r:id="rId13"/>
+    <p:sldId id="268" r:id="rId14"/>
+    <p:sldId id="269" r:id="rId15"/>
   </p:sldIdLst>
   <p:sldSz cx="12192000" cy="6858000"/>
   <p:notesSz cx="6858000" cy="9144000"/>
@@ -112,6 +117,11 @@
       </a:defRPr>
     </a:lvl9pPr>
   </p:defaultTextStyle>
+  <p:extLst>
+    <p:ext uri="{EFAFB233-063F-42B5-8137-9DF3F51BA10A}">
+      <p15:sldGuideLst xmlns:p15="http://schemas.microsoft.com/office/powerpoint/2012/main"/>
+    </p:ext>
+  </p:extLst>
 </p:presentation>
 </file>
 
@@ -262,7 +272,7 @@
           <a:p>
             <a:fld id="{B846F18F-242A-48E0-8EA2-36B1E4CAECCB}" type="datetimeFigureOut">
               <a:rPr lang="en-GB" smtClean="0"/>
-              <a:t>16/07/2025</a:t>
+              <a:t>21/07/2025</a:t>
             </a:fld>
             <a:endParaRPr lang="en-GB"/>
           </a:p>
@@ -460,7 +470,7 @@
           <a:p>
             <a:fld id="{B846F18F-242A-48E0-8EA2-36B1E4CAECCB}" type="datetimeFigureOut">
               <a:rPr lang="en-GB" smtClean="0"/>
-              <a:t>16/07/2025</a:t>
+              <a:t>21/07/2025</a:t>
             </a:fld>
             <a:endParaRPr lang="en-GB"/>
           </a:p>
@@ -668,7 +678,7 @@
           <a:p>
             <a:fld id="{B846F18F-242A-48E0-8EA2-36B1E4CAECCB}" type="datetimeFigureOut">
               <a:rPr lang="en-GB" smtClean="0"/>
-              <a:t>16/07/2025</a:t>
+              <a:t>21/07/2025</a:t>
             </a:fld>
             <a:endParaRPr lang="en-GB"/>
           </a:p>
@@ -866,7 +876,7 @@
           <a:p>
             <a:fld id="{B846F18F-242A-48E0-8EA2-36B1E4CAECCB}" type="datetimeFigureOut">
               <a:rPr lang="en-GB" smtClean="0"/>
-              <a:t>16/07/2025</a:t>
+              <a:t>21/07/2025</a:t>
             </a:fld>
             <a:endParaRPr lang="en-GB"/>
           </a:p>
@@ -1141,7 +1151,7 @@
           <a:p>
             <a:fld id="{B846F18F-242A-48E0-8EA2-36B1E4CAECCB}" type="datetimeFigureOut">
               <a:rPr lang="en-GB" smtClean="0"/>
-              <a:t>16/07/2025</a:t>
+              <a:t>21/07/2025</a:t>
             </a:fld>
             <a:endParaRPr lang="en-GB"/>
           </a:p>
@@ -1406,7 +1416,7 @@
           <a:p>
             <a:fld id="{B846F18F-242A-48E0-8EA2-36B1E4CAECCB}" type="datetimeFigureOut">
               <a:rPr lang="en-GB" smtClean="0"/>
-              <a:t>16/07/2025</a:t>
+              <a:t>21/07/2025</a:t>
             </a:fld>
             <a:endParaRPr lang="en-GB"/>
           </a:p>
@@ -1818,7 +1828,7 @@
           <a:p>
             <a:fld id="{B846F18F-242A-48E0-8EA2-36B1E4CAECCB}" type="datetimeFigureOut">
               <a:rPr lang="en-GB" smtClean="0"/>
-              <a:t>16/07/2025</a:t>
+              <a:t>21/07/2025</a:t>
             </a:fld>
             <a:endParaRPr lang="en-GB"/>
           </a:p>
@@ -1959,7 +1969,7 @@
           <a:p>
             <a:fld id="{B846F18F-242A-48E0-8EA2-36B1E4CAECCB}" type="datetimeFigureOut">
               <a:rPr lang="en-GB" smtClean="0"/>
-              <a:t>16/07/2025</a:t>
+              <a:t>21/07/2025</a:t>
             </a:fld>
             <a:endParaRPr lang="en-GB"/>
           </a:p>
@@ -2072,7 +2082,7 @@
           <a:p>
             <a:fld id="{B846F18F-242A-48E0-8EA2-36B1E4CAECCB}" type="datetimeFigureOut">
               <a:rPr lang="en-GB" smtClean="0"/>
-              <a:t>16/07/2025</a:t>
+              <a:t>21/07/2025</a:t>
             </a:fld>
             <a:endParaRPr lang="en-GB"/>
           </a:p>
@@ -2383,7 +2393,7 @@
           <a:p>
             <a:fld id="{B846F18F-242A-48E0-8EA2-36B1E4CAECCB}" type="datetimeFigureOut">
               <a:rPr lang="en-GB" smtClean="0"/>
-              <a:t>16/07/2025</a:t>
+              <a:t>21/07/2025</a:t>
             </a:fld>
             <a:endParaRPr lang="en-GB"/>
           </a:p>
@@ -2671,7 +2681,7 @@
           <a:p>
             <a:fld id="{B846F18F-242A-48E0-8EA2-36B1E4CAECCB}" type="datetimeFigureOut">
               <a:rPr lang="en-GB" smtClean="0"/>
-              <a:t>16/07/2025</a:t>
+              <a:t>21/07/2025</a:t>
             </a:fld>
             <a:endParaRPr lang="en-GB"/>
           </a:p>
@@ -2912,7 +2922,7 @@
           <a:p>
             <a:fld id="{B846F18F-242A-48E0-8EA2-36B1E4CAECCB}" type="datetimeFigureOut">
               <a:rPr lang="en-GB" smtClean="0"/>
-              <a:t>16/07/2025</a:t>
+              <a:t>21/07/2025</a:t>
             </a:fld>
             <a:endParaRPr lang="en-GB"/>
           </a:p>
@@ -3386,6 +3396,673 @@
     <p:extLst>
       <p:ext uri="{BB962C8B-B14F-4D97-AF65-F5344CB8AC3E}">
         <p14:creationId xmlns:p14="http://schemas.microsoft.com/office/powerpoint/2010/main" val="2288228017"/>
+      </p:ext>
+    </p:extLst>
+  </p:cSld>
+  <p:clrMapOvr>
+    <a:masterClrMapping/>
+  </p:clrMapOvr>
+</p:sld>
+</file>
+
+<file path=ppt/slides/slide10.xml><?xml version="1.0" encoding="utf-8"?>
+<p:sld xmlns:a="http://schemas.openxmlformats.org/drawingml/2006/main" xmlns:r="http://schemas.openxmlformats.org/officeDocument/2006/relationships" xmlns:p="http://schemas.openxmlformats.org/presentationml/2006/main">
+  <p:cSld>
+    <p:spTree>
+      <p:nvGrpSpPr>
+        <p:cNvPr id="1" name=""/>
+        <p:cNvGrpSpPr/>
+        <p:nvPr/>
+      </p:nvGrpSpPr>
+      <p:grpSpPr>
+        <a:xfrm>
+          <a:off x="0" y="0"/>
+          <a:ext cx="0" cy="0"/>
+          <a:chOff x="0" y="0"/>
+          <a:chExt cx="0" cy="0"/>
+        </a:xfrm>
+      </p:grpSpPr>
+      <p:sp>
+        <p:nvSpPr>
+          <p:cNvPr id="2" name="Title 1">
+            <a:extLst>
+              <a:ext uri="{FF2B5EF4-FFF2-40B4-BE49-F238E27FC236}">
+                <a16:creationId xmlns:a16="http://schemas.microsoft.com/office/drawing/2014/main" id="{EE67D39C-9743-33AB-CCDE-8D4359DBC0B5}"/>
+              </a:ext>
+            </a:extLst>
+          </p:cNvPr>
+          <p:cNvSpPr>
+            <a:spLocks noGrp="1"/>
+          </p:cNvSpPr>
+          <p:nvPr>
+            <p:ph type="title"/>
+          </p:nvPr>
+        </p:nvSpPr>
+        <p:spPr/>
+        <p:txBody>
+          <a:bodyPr/>
+          <a:lstStyle/>
+          <a:p>
+            <a:r>
+              <a:rPr lang="en-GB" dirty="0"/>
+              <a:t>Account creation </a:t>
+            </a:r>
+            <a:r>
+              <a:rPr lang="en-GB" dirty="0" err="1"/>
+              <a:t>gui</a:t>
+            </a:r>
+            <a:endParaRPr lang="en-GB" dirty="0"/>
+          </a:p>
+        </p:txBody>
+      </p:sp>
+      <p:sp>
+        <p:nvSpPr>
+          <p:cNvPr id="3" name="Content Placeholder 2">
+            <a:extLst>
+              <a:ext uri="{FF2B5EF4-FFF2-40B4-BE49-F238E27FC236}">
+                <a16:creationId xmlns:a16="http://schemas.microsoft.com/office/drawing/2014/main" id="{CDFD5FF9-60FC-86A4-E250-217D0691CAC6}"/>
+              </a:ext>
+            </a:extLst>
+          </p:cNvPr>
+          <p:cNvSpPr>
+            <a:spLocks noGrp="1"/>
+          </p:cNvSpPr>
+          <p:nvPr>
+            <p:ph idx="1"/>
+          </p:nvPr>
+        </p:nvSpPr>
+        <p:spPr/>
+        <p:txBody>
+          <a:bodyPr/>
+          <a:lstStyle/>
+          <a:p>
+            <a:endParaRPr lang="en-GB"/>
+          </a:p>
+        </p:txBody>
+      </p:sp>
+      <p:pic>
+        <p:nvPicPr>
+          <p:cNvPr id="5" name="Picture 4">
+            <a:extLst>
+              <a:ext uri="{FF2B5EF4-FFF2-40B4-BE49-F238E27FC236}">
+                <a16:creationId xmlns:a16="http://schemas.microsoft.com/office/drawing/2014/main" id="{8FDC8DFF-5FF5-3204-600F-B7CC61773E02}"/>
+              </a:ext>
+            </a:extLst>
+          </p:cNvPr>
+          <p:cNvPicPr>
+            <a:picLocks noChangeAspect="1"/>
+          </p:cNvPicPr>
+          <p:nvPr/>
+        </p:nvPicPr>
+        <p:blipFill>
+          <a:blip r:embed="rId2"/>
+          <a:stretch>
+            <a:fillRect/>
+          </a:stretch>
+        </p:blipFill>
+        <p:spPr>
+          <a:xfrm>
+            <a:off x="384647" y="1636712"/>
+            <a:ext cx="7105215" cy="4856163"/>
+          </a:xfrm>
+          <a:prstGeom prst="rect">
+            <a:avLst/>
+          </a:prstGeom>
+        </p:spPr>
+      </p:pic>
+      <p:pic>
+        <p:nvPicPr>
+          <p:cNvPr id="7" name="Picture 6">
+            <a:extLst>
+              <a:ext uri="{FF2B5EF4-FFF2-40B4-BE49-F238E27FC236}">
+                <a16:creationId xmlns:a16="http://schemas.microsoft.com/office/drawing/2014/main" id="{F46D8FF8-E698-635F-5447-31D4FE7DFFA0}"/>
+              </a:ext>
+            </a:extLst>
+          </p:cNvPr>
+          <p:cNvPicPr>
+            <a:picLocks noChangeAspect="1"/>
+          </p:cNvPicPr>
+          <p:nvPr/>
+        </p:nvPicPr>
+        <p:blipFill>
+          <a:blip r:embed="rId3"/>
+          <a:stretch>
+            <a:fillRect/>
+          </a:stretch>
+        </p:blipFill>
+        <p:spPr>
+          <a:xfrm>
+            <a:off x="4686105" y="1825625"/>
+            <a:ext cx="7121248" cy="4856163"/>
+          </a:xfrm>
+          <a:prstGeom prst="rect">
+            <a:avLst/>
+          </a:prstGeom>
+        </p:spPr>
+      </p:pic>
+      <p:pic>
+        <p:nvPicPr>
+          <p:cNvPr id="9" name="Picture 8">
+            <a:extLst>
+              <a:ext uri="{FF2B5EF4-FFF2-40B4-BE49-F238E27FC236}">
+                <a16:creationId xmlns:a16="http://schemas.microsoft.com/office/drawing/2014/main" id="{89AF855C-D75C-360E-7D21-981C7C9F09B9}"/>
+              </a:ext>
+            </a:extLst>
+          </p:cNvPr>
+          <p:cNvPicPr>
+            <a:picLocks noChangeAspect="1"/>
+          </p:cNvPicPr>
+          <p:nvPr/>
+        </p:nvPicPr>
+        <p:blipFill>
+          <a:blip r:embed="rId4"/>
+          <a:stretch>
+            <a:fillRect/>
+          </a:stretch>
+        </p:blipFill>
+        <p:spPr>
+          <a:xfrm>
+            <a:off x="5808361" y="60325"/>
+            <a:ext cx="6383639" cy="4351338"/>
+          </a:xfrm>
+          <a:prstGeom prst="rect">
+            <a:avLst/>
+          </a:prstGeom>
+        </p:spPr>
+      </p:pic>
+    </p:spTree>
+    <p:extLst>
+      <p:ext uri="{BB962C8B-B14F-4D97-AF65-F5344CB8AC3E}">
+        <p14:creationId xmlns:p14="http://schemas.microsoft.com/office/powerpoint/2010/main" val="2000046633"/>
+      </p:ext>
+    </p:extLst>
+  </p:cSld>
+  <p:clrMapOvr>
+    <a:masterClrMapping/>
+  </p:clrMapOvr>
+</p:sld>
+</file>
+
+<file path=ppt/slides/slide11.xml><?xml version="1.0" encoding="utf-8"?>
+<p:sld xmlns:a="http://schemas.openxmlformats.org/drawingml/2006/main" xmlns:r="http://schemas.openxmlformats.org/officeDocument/2006/relationships" xmlns:p="http://schemas.openxmlformats.org/presentationml/2006/main">
+  <p:cSld>
+    <p:spTree>
+      <p:nvGrpSpPr>
+        <p:cNvPr id="1" name=""/>
+        <p:cNvGrpSpPr/>
+        <p:nvPr/>
+      </p:nvGrpSpPr>
+      <p:grpSpPr>
+        <a:xfrm>
+          <a:off x="0" y="0"/>
+          <a:ext cx="0" cy="0"/>
+          <a:chOff x="0" y="0"/>
+          <a:chExt cx="0" cy="0"/>
+        </a:xfrm>
+      </p:grpSpPr>
+      <p:sp>
+        <p:nvSpPr>
+          <p:cNvPr id="2" name="Title 1">
+            <a:extLst>
+              <a:ext uri="{FF2B5EF4-FFF2-40B4-BE49-F238E27FC236}">
+                <a16:creationId xmlns:a16="http://schemas.microsoft.com/office/drawing/2014/main" id="{3BB1263A-7B4B-A6B7-B25B-137BE82BDBA5}"/>
+              </a:ext>
+            </a:extLst>
+          </p:cNvPr>
+          <p:cNvSpPr>
+            <a:spLocks noGrp="1"/>
+          </p:cNvSpPr>
+          <p:nvPr>
+            <p:ph type="title"/>
+          </p:nvPr>
+        </p:nvSpPr>
+        <p:spPr/>
+        <p:txBody>
+          <a:bodyPr/>
+          <a:lstStyle/>
+          <a:p>
+            <a:r>
+              <a:rPr lang="en-GB" dirty="0"/>
+              <a:t>Account creation CLI</a:t>
+            </a:r>
+          </a:p>
+        </p:txBody>
+      </p:sp>
+      <p:sp>
+        <p:nvSpPr>
+          <p:cNvPr id="3" name="Content Placeholder 2">
+            <a:extLst>
+              <a:ext uri="{FF2B5EF4-FFF2-40B4-BE49-F238E27FC236}">
+                <a16:creationId xmlns:a16="http://schemas.microsoft.com/office/drawing/2014/main" id="{DA05C58D-B60F-2030-A959-79A33E0DB141}"/>
+              </a:ext>
+            </a:extLst>
+          </p:cNvPr>
+          <p:cNvSpPr>
+            <a:spLocks noGrp="1"/>
+          </p:cNvSpPr>
+          <p:nvPr>
+            <p:ph idx="1"/>
+          </p:nvPr>
+        </p:nvSpPr>
+        <p:spPr/>
+        <p:txBody>
+          <a:bodyPr/>
+          <a:lstStyle/>
+          <a:p>
+            <a:endParaRPr lang="en-GB"/>
+          </a:p>
+        </p:txBody>
+      </p:sp>
+      <p:pic>
+        <p:nvPicPr>
+          <p:cNvPr id="5" name="Picture 4">
+            <a:extLst>
+              <a:ext uri="{FF2B5EF4-FFF2-40B4-BE49-F238E27FC236}">
+                <a16:creationId xmlns:a16="http://schemas.microsoft.com/office/drawing/2014/main" id="{57F5CB5E-4A71-EB54-781C-3BA27AF7DB87}"/>
+              </a:ext>
+            </a:extLst>
+          </p:cNvPr>
+          <p:cNvPicPr>
+            <a:picLocks noChangeAspect="1"/>
+          </p:cNvPicPr>
+          <p:nvPr/>
+        </p:nvPicPr>
+        <p:blipFill>
+          <a:blip r:embed="rId2"/>
+          <a:stretch>
+            <a:fillRect/>
+          </a:stretch>
+        </p:blipFill>
+        <p:spPr>
+          <a:xfrm>
+            <a:off x="838200" y="1236133"/>
+            <a:ext cx="7705837" cy="5256742"/>
+          </a:xfrm>
+          <a:prstGeom prst="rect">
+            <a:avLst/>
+          </a:prstGeom>
+        </p:spPr>
+      </p:pic>
+      <p:pic>
+        <p:nvPicPr>
+          <p:cNvPr id="7" name="Picture 6">
+            <a:extLst>
+              <a:ext uri="{FF2B5EF4-FFF2-40B4-BE49-F238E27FC236}">
+                <a16:creationId xmlns:a16="http://schemas.microsoft.com/office/drawing/2014/main" id="{BADB7D55-EE06-31A9-2CFE-8E91D006E422}"/>
+              </a:ext>
+            </a:extLst>
+          </p:cNvPr>
+          <p:cNvPicPr>
+            <a:picLocks noChangeAspect="1"/>
+          </p:cNvPicPr>
+          <p:nvPr/>
+        </p:nvPicPr>
+        <p:blipFill>
+          <a:blip r:embed="rId3"/>
+          <a:stretch>
+            <a:fillRect/>
+          </a:stretch>
+        </p:blipFill>
+        <p:spPr>
+          <a:xfrm>
+            <a:off x="5450135" y="1566913"/>
+            <a:ext cx="6741865" cy="4610050"/>
+          </a:xfrm>
+          <a:prstGeom prst="rect">
+            <a:avLst/>
+          </a:prstGeom>
+        </p:spPr>
+      </p:pic>
+    </p:spTree>
+    <p:extLst>
+      <p:ext uri="{BB962C8B-B14F-4D97-AF65-F5344CB8AC3E}">
+        <p14:creationId xmlns:p14="http://schemas.microsoft.com/office/powerpoint/2010/main" val="2531367515"/>
+      </p:ext>
+    </p:extLst>
+  </p:cSld>
+  <p:clrMapOvr>
+    <a:masterClrMapping/>
+  </p:clrMapOvr>
+</p:sld>
+</file>
+
+<file path=ppt/slides/slide12.xml><?xml version="1.0" encoding="utf-8"?>
+<p:sld xmlns:a="http://schemas.openxmlformats.org/drawingml/2006/main" xmlns:r="http://schemas.openxmlformats.org/officeDocument/2006/relationships" xmlns:p="http://schemas.openxmlformats.org/presentationml/2006/main">
+  <p:cSld>
+    <p:spTree>
+      <p:nvGrpSpPr>
+        <p:cNvPr id="1" name=""/>
+        <p:cNvGrpSpPr/>
+        <p:nvPr/>
+      </p:nvGrpSpPr>
+      <p:grpSpPr>
+        <a:xfrm>
+          <a:off x="0" y="0"/>
+          <a:ext cx="0" cy="0"/>
+          <a:chOff x="0" y="0"/>
+          <a:chExt cx="0" cy="0"/>
+        </a:xfrm>
+      </p:grpSpPr>
+      <p:sp>
+        <p:nvSpPr>
+          <p:cNvPr id="2" name="Title 1">
+            <a:extLst>
+              <a:ext uri="{FF2B5EF4-FFF2-40B4-BE49-F238E27FC236}">
+                <a16:creationId xmlns:a16="http://schemas.microsoft.com/office/drawing/2014/main" id="{1B0DDB8E-EDB5-3978-EE0C-BE615298A241}"/>
+              </a:ext>
+            </a:extLst>
+          </p:cNvPr>
+          <p:cNvSpPr>
+            <a:spLocks noGrp="1"/>
+          </p:cNvSpPr>
+          <p:nvPr>
+            <p:ph type="title"/>
+          </p:nvPr>
+        </p:nvSpPr>
+        <p:spPr/>
+        <p:txBody>
+          <a:bodyPr/>
+          <a:lstStyle/>
+          <a:p>
+            <a:endParaRPr lang="en-GB"/>
+          </a:p>
+        </p:txBody>
+      </p:sp>
+      <p:sp>
+        <p:nvSpPr>
+          <p:cNvPr id="3" name="Content Placeholder 2">
+            <a:extLst>
+              <a:ext uri="{FF2B5EF4-FFF2-40B4-BE49-F238E27FC236}">
+                <a16:creationId xmlns:a16="http://schemas.microsoft.com/office/drawing/2014/main" id="{2F119A65-8EDE-B7C2-5E9A-41BA9B7B94EF}"/>
+              </a:ext>
+            </a:extLst>
+          </p:cNvPr>
+          <p:cNvSpPr>
+            <a:spLocks noGrp="1"/>
+          </p:cNvSpPr>
+          <p:nvPr>
+            <p:ph idx="1"/>
+          </p:nvPr>
+        </p:nvSpPr>
+        <p:spPr>
+          <a:xfrm>
+            <a:off x="9245600" y="605896"/>
+            <a:ext cx="2108200" cy="5571067"/>
+          </a:xfrm>
+        </p:spPr>
+        <p:txBody>
+          <a:bodyPr/>
+          <a:lstStyle/>
+          <a:p>
+            <a:r>
+              <a:rPr lang="en-GB" dirty="0"/>
+              <a:t>Give </a:t>
+            </a:r>
+            <a:r>
+              <a:rPr lang="en-GB" dirty="0" err="1"/>
+              <a:t>sudo</a:t>
+            </a:r>
+            <a:r>
+              <a:rPr lang="en-GB" dirty="0"/>
+              <a:t> privileges to new admin user account</a:t>
+            </a:r>
+          </a:p>
+        </p:txBody>
+      </p:sp>
+      <p:pic>
+        <p:nvPicPr>
+          <p:cNvPr id="5" name="Picture 4">
+            <a:extLst>
+              <a:ext uri="{FF2B5EF4-FFF2-40B4-BE49-F238E27FC236}">
+                <a16:creationId xmlns:a16="http://schemas.microsoft.com/office/drawing/2014/main" id="{6D3816A1-935F-3736-0EED-992889D2FBDC}"/>
+              </a:ext>
+            </a:extLst>
+          </p:cNvPr>
+          <p:cNvPicPr>
+            <a:picLocks noChangeAspect="1"/>
+          </p:cNvPicPr>
+          <p:nvPr/>
+        </p:nvPicPr>
+        <p:blipFill>
+          <a:blip r:embed="rId2"/>
+          <a:stretch>
+            <a:fillRect/>
+          </a:stretch>
+        </p:blipFill>
+        <p:spPr>
+          <a:xfrm>
+            <a:off x="647954" y="681037"/>
+            <a:ext cx="8163607" cy="5571067"/>
+          </a:xfrm>
+          <a:prstGeom prst="rect">
+            <a:avLst/>
+          </a:prstGeom>
+        </p:spPr>
+      </p:pic>
+    </p:spTree>
+    <p:extLst>
+      <p:ext uri="{BB962C8B-B14F-4D97-AF65-F5344CB8AC3E}">
+        <p14:creationId xmlns:p14="http://schemas.microsoft.com/office/powerpoint/2010/main" val="3423797450"/>
+      </p:ext>
+    </p:extLst>
+  </p:cSld>
+  <p:clrMapOvr>
+    <a:masterClrMapping/>
+  </p:clrMapOvr>
+</p:sld>
+</file>
+
+<file path=ppt/slides/slide13.xml><?xml version="1.0" encoding="utf-8"?>
+<p:sld xmlns:a="http://schemas.openxmlformats.org/drawingml/2006/main" xmlns:r="http://schemas.openxmlformats.org/officeDocument/2006/relationships" xmlns:p="http://schemas.openxmlformats.org/presentationml/2006/main">
+  <p:cSld>
+    <p:spTree>
+      <p:nvGrpSpPr>
+        <p:cNvPr id="1" name=""/>
+        <p:cNvGrpSpPr/>
+        <p:nvPr/>
+      </p:nvGrpSpPr>
+      <p:grpSpPr>
+        <a:xfrm>
+          <a:off x="0" y="0"/>
+          <a:ext cx="0" cy="0"/>
+          <a:chOff x="0" y="0"/>
+          <a:chExt cx="0" cy="0"/>
+        </a:xfrm>
+      </p:grpSpPr>
+      <p:sp>
+        <p:nvSpPr>
+          <p:cNvPr id="2" name="Title 1">
+            <a:extLst>
+              <a:ext uri="{FF2B5EF4-FFF2-40B4-BE49-F238E27FC236}">
+                <a16:creationId xmlns:a16="http://schemas.microsoft.com/office/drawing/2014/main" id="{C7E1EE8D-AE4A-390A-3D63-0EEA94958911}"/>
+              </a:ext>
+            </a:extLst>
+          </p:cNvPr>
+          <p:cNvSpPr>
+            <a:spLocks noGrp="1"/>
+          </p:cNvSpPr>
+          <p:nvPr>
+            <p:ph type="title"/>
+          </p:nvPr>
+        </p:nvSpPr>
+        <p:spPr/>
+        <p:txBody>
+          <a:bodyPr/>
+          <a:lstStyle/>
+          <a:p>
+            <a:endParaRPr lang="en-GB"/>
+          </a:p>
+        </p:txBody>
+      </p:sp>
+      <p:sp>
+        <p:nvSpPr>
+          <p:cNvPr id="3" name="Content Placeholder 2">
+            <a:extLst>
+              <a:ext uri="{FF2B5EF4-FFF2-40B4-BE49-F238E27FC236}">
+                <a16:creationId xmlns:a16="http://schemas.microsoft.com/office/drawing/2014/main" id="{09DA340A-354B-24C7-9E54-4625DE75EEC7}"/>
+              </a:ext>
+            </a:extLst>
+          </p:cNvPr>
+          <p:cNvSpPr>
+            <a:spLocks noGrp="1"/>
+          </p:cNvSpPr>
+          <p:nvPr>
+            <p:ph idx="1"/>
+          </p:nvPr>
+        </p:nvSpPr>
+        <p:spPr/>
+        <p:txBody>
+          <a:bodyPr/>
+          <a:lstStyle/>
+          <a:p>
+            <a:endParaRPr lang="en-GB"/>
+          </a:p>
+        </p:txBody>
+      </p:sp>
+      <p:pic>
+        <p:nvPicPr>
+          <p:cNvPr id="5" name="Picture 4">
+            <a:extLst>
+              <a:ext uri="{FF2B5EF4-FFF2-40B4-BE49-F238E27FC236}">
+                <a16:creationId xmlns:a16="http://schemas.microsoft.com/office/drawing/2014/main" id="{1FDAFF1E-8914-715B-7740-0BF7492EFB25}"/>
+              </a:ext>
+            </a:extLst>
+          </p:cNvPr>
+          <p:cNvPicPr>
+            <a:picLocks noChangeAspect="1"/>
+          </p:cNvPicPr>
+          <p:nvPr/>
+        </p:nvPicPr>
+        <p:blipFill>
+          <a:blip r:embed="rId2"/>
+          <a:stretch>
+            <a:fillRect/>
+          </a:stretch>
+        </p:blipFill>
+        <p:spPr>
+          <a:xfrm>
+            <a:off x="1059905" y="0"/>
+            <a:ext cx="10072190" cy="6858000"/>
+          </a:xfrm>
+          <a:prstGeom prst="rect">
+            <a:avLst/>
+          </a:prstGeom>
+        </p:spPr>
+      </p:pic>
+    </p:spTree>
+    <p:extLst>
+      <p:ext uri="{BB962C8B-B14F-4D97-AF65-F5344CB8AC3E}">
+        <p14:creationId xmlns:p14="http://schemas.microsoft.com/office/powerpoint/2010/main" val="553514285"/>
+      </p:ext>
+    </p:extLst>
+  </p:cSld>
+  <p:clrMapOvr>
+    <a:masterClrMapping/>
+  </p:clrMapOvr>
+</p:sld>
+</file>
+
+<file path=ppt/slides/slide14.xml><?xml version="1.0" encoding="utf-8"?>
+<p:sld xmlns:a="http://schemas.openxmlformats.org/drawingml/2006/main" xmlns:r="http://schemas.openxmlformats.org/officeDocument/2006/relationships" xmlns:p="http://schemas.openxmlformats.org/presentationml/2006/main">
+  <p:cSld>
+    <p:spTree>
+      <p:nvGrpSpPr>
+        <p:cNvPr id="1" name=""/>
+        <p:cNvGrpSpPr/>
+        <p:nvPr/>
+      </p:nvGrpSpPr>
+      <p:grpSpPr>
+        <a:xfrm>
+          <a:off x="0" y="0"/>
+          <a:ext cx="0" cy="0"/>
+          <a:chOff x="0" y="0"/>
+          <a:chExt cx="0" cy="0"/>
+        </a:xfrm>
+      </p:grpSpPr>
+      <p:sp>
+        <p:nvSpPr>
+          <p:cNvPr id="2" name="Title 1">
+            <a:extLst>
+              <a:ext uri="{FF2B5EF4-FFF2-40B4-BE49-F238E27FC236}">
+                <a16:creationId xmlns:a16="http://schemas.microsoft.com/office/drawing/2014/main" id="{045A0EBB-9861-C915-1C06-9FC3CB24ABEA}"/>
+              </a:ext>
+            </a:extLst>
+          </p:cNvPr>
+          <p:cNvSpPr>
+            <a:spLocks noGrp="1"/>
+          </p:cNvSpPr>
+          <p:nvPr>
+            <p:ph type="title"/>
+          </p:nvPr>
+        </p:nvSpPr>
+        <p:spPr/>
+        <p:txBody>
+          <a:bodyPr/>
+          <a:lstStyle/>
+          <a:p>
+            <a:endParaRPr lang="en-GB"/>
+          </a:p>
+        </p:txBody>
+      </p:sp>
+      <p:sp>
+        <p:nvSpPr>
+          <p:cNvPr id="3" name="Content Placeholder 2">
+            <a:extLst>
+              <a:ext uri="{FF2B5EF4-FFF2-40B4-BE49-F238E27FC236}">
+                <a16:creationId xmlns:a16="http://schemas.microsoft.com/office/drawing/2014/main" id="{FD4E0919-CDA8-651A-5C95-30088487C2F6}"/>
+              </a:ext>
+            </a:extLst>
+          </p:cNvPr>
+          <p:cNvSpPr>
+            <a:spLocks noGrp="1"/>
+          </p:cNvSpPr>
+          <p:nvPr>
+            <p:ph idx="1"/>
+          </p:nvPr>
+        </p:nvSpPr>
+        <p:spPr/>
+        <p:txBody>
+          <a:bodyPr/>
+          <a:lstStyle/>
+          <a:p>
+            <a:endParaRPr lang="en-GB"/>
+          </a:p>
+        </p:txBody>
+      </p:sp>
+      <p:pic>
+        <p:nvPicPr>
+          <p:cNvPr id="5" name="Picture 4">
+            <a:extLst>
+              <a:ext uri="{FF2B5EF4-FFF2-40B4-BE49-F238E27FC236}">
+                <a16:creationId xmlns:a16="http://schemas.microsoft.com/office/drawing/2014/main" id="{D3D98B32-9873-A267-3CD1-EA701CF213B2}"/>
+              </a:ext>
+            </a:extLst>
+          </p:cNvPr>
+          <p:cNvPicPr>
+            <a:picLocks noChangeAspect="1"/>
+          </p:cNvPicPr>
+          <p:nvPr/>
+        </p:nvPicPr>
+        <p:blipFill>
+          <a:blip r:embed="rId2"/>
+          <a:stretch>
+            <a:fillRect/>
+          </a:stretch>
+        </p:blipFill>
+        <p:spPr>
+          <a:xfrm>
+            <a:off x="838200" y="1583465"/>
+            <a:ext cx="10924077" cy="3691070"/>
+          </a:xfrm>
+          <a:prstGeom prst="rect">
+            <a:avLst/>
+          </a:prstGeom>
+        </p:spPr>
+      </p:pic>
+    </p:spTree>
+    <p:extLst>
+      <p:ext uri="{BB962C8B-B14F-4D97-AF65-F5344CB8AC3E}">
+        <p14:creationId xmlns:p14="http://schemas.microsoft.com/office/powerpoint/2010/main" val="521840649"/>
       </p:ext>
     </p:extLst>
   </p:cSld>

</xml_diff>

<commit_message>
CW2 development, 1st section and user account section complete
</commit_message>
<xml_diff>
--- a/401_OperatingSystems/assignments/LINUX UBUNTU.pptx
+++ b/401_OperatingSystems/assignments/LINUX UBUNTU.pptx
@@ -272,7 +272,7 @@
           <a:p>
             <a:fld id="{B846F18F-242A-48E0-8EA2-36B1E4CAECCB}" type="datetimeFigureOut">
               <a:rPr lang="en-GB" smtClean="0"/>
-              <a:t>21/07/2025</a:t>
+              <a:t>22/07/2025</a:t>
             </a:fld>
             <a:endParaRPr lang="en-GB"/>
           </a:p>
@@ -470,7 +470,7 @@
           <a:p>
             <a:fld id="{B846F18F-242A-48E0-8EA2-36B1E4CAECCB}" type="datetimeFigureOut">
               <a:rPr lang="en-GB" smtClean="0"/>
-              <a:t>21/07/2025</a:t>
+              <a:t>22/07/2025</a:t>
             </a:fld>
             <a:endParaRPr lang="en-GB"/>
           </a:p>
@@ -678,7 +678,7 @@
           <a:p>
             <a:fld id="{B846F18F-242A-48E0-8EA2-36B1E4CAECCB}" type="datetimeFigureOut">
               <a:rPr lang="en-GB" smtClean="0"/>
-              <a:t>21/07/2025</a:t>
+              <a:t>22/07/2025</a:t>
             </a:fld>
             <a:endParaRPr lang="en-GB"/>
           </a:p>
@@ -876,7 +876,7 @@
           <a:p>
             <a:fld id="{B846F18F-242A-48E0-8EA2-36B1E4CAECCB}" type="datetimeFigureOut">
               <a:rPr lang="en-GB" smtClean="0"/>
-              <a:t>21/07/2025</a:t>
+              <a:t>22/07/2025</a:t>
             </a:fld>
             <a:endParaRPr lang="en-GB"/>
           </a:p>
@@ -1151,7 +1151,7 @@
           <a:p>
             <a:fld id="{B846F18F-242A-48E0-8EA2-36B1E4CAECCB}" type="datetimeFigureOut">
               <a:rPr lang="en-GB" smtClean="0"/>
-              <a:t>21/07/2025</a:t>
+              <a:t>22/07/2025</a:t>
             </a:fld>
             <a:endParaRPr lang="en-GB"/>
           </a:p>
@@ -1416,7 +1416,7 @@
           <a:p>
             <a:fld id="{B846F18F-242A-48E0-8EA2-36B1E4CAECCB}" type="datetimeFigureOut">
               <a:rPr lang="en-GB" smtClean="0"/>
-              <a:t>21/07/2025</a:t>
+              <a:t>22/07/2025</a:t>
             </a:fld>
             <a:endParaRPr lang="en-GB"/>
           </a:p>
@@ -1828,7 +1828,7 @@
           <a:p>
             <a:fld id="{B846F18F-242A-48E0-8EA2-36B1E4CAECCB}" type="datetimeFigureOut">
               <a:rPr lang="en-GB" smtClean="0"/>
-              <a:t>21/07/2025</a:t>
+              <a:t>22/07/2025</a:t>
             </a:fld>
             <a:endParaRPr lang="en-GB"/>
           </a:p>
@@ -1969,7 +1969,7 @@
           <a:p>
             <a:fld id="{B846F18F-242A-48E0-8EA2-36B1E4CAECCB}" type="datetimeFigureOut">
               <a:rPr lang="en-GB" smtClean="0"/>
-              <a:t>21/07/2025</a:t>
+              <a:t>22/07/2025</a:t>
             </a:fld>
             <a:endParaRPr lang="en-GB"/>
           </a:p>
@@ -2082,7 +2082,7 @@
           <a:p>
             <a:fld id="{B846F18F-242A-48E0-8EA2-36B1E4CAECCB}" type="datetimeFigureOut">
               <a:rPr lang="en-GB" smtClean="0"/>
-              <a:t>21/07/2025</a:t>
+              <a:t>22/07/2025</a:t>
             </a:fld>
             <a:endParaRPr lang="en-GB"/>
           </a:p>
@@ -2393,7 +2393,7 @@
           <a:p>
             <a:fld id="{B846F18F-242A-48E0-8EA2-36B1E4CAECCB}" type="datetimeFigureOut">
               <a:rPr lang="en-GB" smtClean="0"/>
-              <a:t>21/07/2025</a:t>
+              <a:t>22/07/2025</a:t>
             </a:fld>
             <a:endParaRPr lang="en-GB"/>
           </a:p>
@@ -2681,7 +2681,7 @@
           <a:p>
             <a:fld id="{B846F18F-242A-48E0-8EA2-36B1E4CAECCB}" type="datetimeFigureOut">
               <a:rPr lang="en-GB" smtClean="0"/>
-              <a:t>21/07/2025</a:t>
+              <a:t>22/07/2025</a:t>
             </a:fld>
             <a:endParaRPr lang="en-GB"/>
           </a:p>
@@ -2922,7 +2922,7 @@
           <a:p>
             <a:fld id="{B846F18F-242A-48E0-8EA2-36B1E4CAECCB}" type="datetimeFigureOut">
               <a:rPr lang="en-GB" smtClean="0"/>
-              <a:t>21/07/2025</a:t>
+              <a:t>22/07/2025</a:t>
             </a:fld>
             <a:endParaRPr lang="en-GB"/>
           </a:p>
@@ -3502,7 +3502,7 @@
         </p:blipFill>
         <p:spPr>
           <a:xfrm>
-            <a:off x="384647" y="1636712"/>
+            <a:off x="311495" y="1027906"/>
             <a:ext cx="7105215" cy="4856163"/>
           </a:xfrm>
           <a:prstGeom prst="rect">
@@ -3532,7 +3532,7 @@
         </p:blipFill>
         <p:spPr>
           <a:xfrm>
-            <a:off x="4686105" y="1825625"/>
+            <a:off x="838200" y="1162843"/>
             <a:ext cx="7121248" cy="4856163"/>
           </a:xfrm>
           <a:prstGeom prst="rect">
@@ -4045,14 +4045,15 @@
         </p:nvPicPr>
         <p:blipFill>
           <a:blip r:embed="rId2"/>
+          <a:srcRect l="1451" t="6561" r="2288" b="8133"/>
           <a:stretch>
             <a:fillRect/>
           </a:stretch>
         </p:blipFill>
         <p:spPr>
           <a:xfrm>
-            <a:off x="838200" y="1583465"/>
-            <a:ext cx="10924077" cy="3691070"/>
+            <a:off x="996697" y="1825625"/>
+            <a:ext cx="10515600" cy="3148711"/>
           </a:xfrm>
           <a:prstGeom prst="rect">
             <a:avLst/>
@@ -5071,7 +5072,7 @@
         <p:spPr>
           <a:xfrm>
             <a:off x="250857" y="365125"/>
-            <a:ext cx="8510668" cy="5811838"/>
+            <a:ext cx="7082631" cy="4836648"/>
           </a:xfrm>
           <a:prstGeom prst="rect">
             <a:avLst/>

</xml_diff>